<commit_message>
📄 update instructions for Project_2
</commit_message>
<xml_diff>
--- a/Project2-Lecture.pptx
+++ b/Project2-Lecture.pptx
@@ -8376,7 +8376,11 @@
           </a:p>
           <a:p>
             <a:r>
-              <a:rPr lang="en-US" dirty="0"/>
+              <a:rPr lang="en-US" dirty="0">
+                <a:highlight>
+                  <a:srgbClr val="00FF00"/>
+                </a:highlight>
+              </a:rPr>
               <a:t>Add and commit the files to version control</a:t>
             </a:r>
           </a:p>
@@ -8562,7 +8566,11 @@
           <a:lstStyle/>
           <a:p>
             <a:r>
-              <a:rPr lang="en-US" dirty="0"/>
+              <a:rPr lang="en-US" dirty="0">
+                <a:highlight>
+                  <a:srgbClr val="00FF00"/>
+                </a:highlight>
+              </a:rPr>
               <a:t>Integrate code from Project 1 into Project 2</a:t>
             </a:r>
           </a:p>

</xml_diff>

<commit_message>
🧠 add MeshCreate() logic
and updated powerpoint/word docs
</commit_message>
<xml_diff>
--- a/Project2-Lecture.pptx
+++ b/Project2-Lecture.pptx
@@ -256,7 +256,7 @@
             <a:fld id="{9CE4D9B5-C23F-4F5B-A510-223EE943FD84}" type="datetimeFigureOut">
               <a:rPr lang="en-US" smtClean="0"/>
               <a:pPr/>
-              <a:t>1/17/2025</a:t>
+              <a:t>1/22/2025</a:t>
             </a:fld>
             <a:endParaRPr lang="en-US"/>
           </a:p>
@@ -843,7 +843,7 @@
             <a:fld id="{CC5FAB66-F69F-4B6C-B526-16B5B129EADB}" type="datetime1">
               <a:rPr lang="en-US" smtClean="0"/>
               <a:pPr/>
-              <a:t>1/17/2025</a:t>
+              <a:t>1/22/2025</a:t>
             </a:fld>
             <a:endParaRPr lang="en-US" dirty="0"/>
           </a:p>
@@ -1247,7 +1247,7 @@
             <a:fld id="{818F3258-39DB-480D-AA11-E1EF94FC4695}" type="datetime1">
               <a:rPr lang="en-US" smtClean="0"/>
               <a:pPr/>
-              <a:t>1/17/2025</a:t>
+              <a:t>1/22/2025</a:t>
             </a:fld>
             <a:endParaRPr lang="en-US" dirty="0"/>
           </a:p>
@@ -1425,7 +1425,7 @@
             <a:fld id="{AEC8A4F3-ED06-48DC-8481-6B075B3F12EC}" type="datetime1">
               <a:rPr lang="en-US" smtClean="0"/>
               <a:pPr/>
-              <a:t>1/17/2025</a:t>
+              <a:t>1/22/2025</a:t>
             </a:fld>
             <a:endParaRPr lang="en-US" dirty="0"/>
           </a:p>
@@ -1689,7 +1689,7 @@
             <a:fld id="{409124BB-FC4B-4459-9E83-B488936AD7B8}" type="datetime1">
               <a:rPr lang="en-US" smtClean="0"/>
               <a:pPr/>
-              <a:t>1/17/2025</a:t>
+              <a:t>1/22/2025</a:t>
             </a:fld>
             <a:endParaRPr lang="en-US" dirty="0"/>
           </a:p>
@@ -2059,7 +2059,7 @@
             <a:fld id="{AE645E34-4EAE-44C6-A808-8E7619B5FCEA}" type="datetime1">
               <a:rPr lang="en-US" smtClean="0"/>
               <a:pPr/>
-              <a:t>1/17/2025</a:t>
+              <a:t>1/22/2025</a:t>
             </a:fld>
             <a:endParaRPr lang="en-US" dirty="0"/>
           </a:p>
@@ -2429,7 +2429,7 @@
             <a:fld id="{7EC34C66-FE28-425E-8208-CF7EDC8DF363}" type="datetime1">
               <a:rPr lang="en-US" smtClean="0"/>
               <a:pPr/>
-              <a:t>1/17/2025</a:t>
+              <a:t>1/22/2025</a:t>
             </a:fld>
             <a:endParaRPr lang="en-US" dirty="0"/>
           </a:p>
@@ -2780,7 +2780,7 @@
             <a:fld id="{0444DE73-A3F0-436D-9600-1A6E66F9FFEF}" type="datetime1">
               <a:rPr lang="en-US" smtClean="0"/>
               <a:pPr/>
-              <a:t>1/17/2025</a:t>
+              <a:t>1/22/2025</a:t>
             </a:fld>
             <a:endParaRPr lang="en-US" dirty="0"/>
           </a:p>
@@ -3062,7 +3062,7 @@
             <a:fld id="{FF58DBF8-50A7-4BC0-9320-D3D97C2642BE}" type="datetime1">
               <a:rPr lang="en-US" smtClean="0"/>
               <a:pPr/>
-              <a:t>1/17/2025</a:t>
+              <a:t>1/22/2025</a:t>
             </a:fld>
             <a:endParaRPr lang="en-US" dirty="0"/>
           </a:p>
@@ -3448,7 +3448,7 @@
             <a:fld id="{3B7CFFA9-120C-49D9-8B33-3C2B12A8DBA4}" type="datetime1">
               <a:rPr lang="en-US" smtClean="0"/>
               <a:pPr/>
-              <a:t>1/17/2025</a:t>
+              <a:t>1/22/2025</a:t>
             </a:fld>
             <a:endParaRPr lang="en-US" dirty="0"/>
           </a:p>
@@ -3574,7 +3574,7 @@
             <a:fld id="{5F74FA30-5998-4A94-AC07-116568D8E4BB}" type="datetime1">
               <a:rPr lang="en-US" smtClean="0"/>
               <a:pPr/>
-              <a:t>1/17/2025</a:t>
+              <a:t>1/22/2025</a:t>
             </a:fld>
             <a:endParaRPr lang="en-US" dirty="0"/>
           </a:p>
@@ -3753,7 +3753,7 @@
             <a:fld id="{7B0B7851-DAC7-4535-82A8-F9F52B85F021}" type="datetime1">
               <a:rPr lang="en-US" smtClean="0"/>
               <a:pPr/>
-              <a:t>1/17/2025</a:t>
+              <a:t>1/22/2025</a:t>
             </a:fld>
             <a:endParaRPr lang="en-US" dirty="0"/>
           </a:p>
@@ -4115,7 +4115,7 @@
             <a:fld id="{58E9D1BF-3D47-4605-A719-999F5E730F58}" type="datetime1">
               <a:rPr lang="en-US" smtClean="0"/>
               <a:pPr/>
-              <a:t>1/17/2025</a:t>
+              <a:t>1/22/2025</a:t>
             </a:fld>
             <a:endParaRPr lang="en-US" dirty="0"/>
           </a:p>
@@ -4429,7 +4429,7 @@
             <a:fld id="{7832CE81-818F-4867-A81A-32FEBE6C803F}" type="datetime1">
               <a:rPr lang="en-US" smtClean="0"/>
               <a:pPr/>
-              <a:t>1/17/2025</a:t>
+              <a:t>1/22/2025</a:t>
             </a:fld>
             <a:endParaRPr lang="en-US" dirty="0"/>
           </a:p>
@@ -8576,33 +8576,53 @@
           </a:p>
           <a:p>
             <a:r>
-              <a:rPr lang="en-US" dirty="0"/>
+              <a:rPr lang="en-US" dirty="0">
+                <a:highlight>
+                  <a:srgbClr val="00FF00"/>
+                </a:highlight>
+              </a:rPr>
               <a:t>Create new .c modules and add stub functions</a:t>
             </a:r>
           </a:p>
           <a:p>
             <a:pPr lvl="1"/>
             <a:r>
-              <a:rPr lang="en-US" i="1" dirty="0"/>
+              <a:rPr lang="en-US" i="1" dirty="0">
+                <a:highlight>
+                  <a:srgbClr val="FFFF00"/>
+                </a:highlight>
+              </a:rPr>
               <a:t>Include comments from the header file or you may miss important requirements (see “NOTES” and “HINTS”)</a:t>
             </a:r>
           </a:p>
           <a:p>
             <a:r>
-              <a:rPr lang="en-US" dirty="0"/>
+              <a:rPr lang="en-US" dirty="0">
+                <a:highlight>
+                  <a:srgbClr val="00FF00"/>
+                </a:highlight>
+              </a:rPr>
               <a:t>Add temporary return values and unreferenced parameter macros as necessary to compile the code</a:t>
             </a:r>
           </a:p>
           <a:p>
             <a:pPr lvl="1"/>
             <a:r>
-              <a:rPr lang="en-US" i="1" dirty="0"/>
+              <a:rPr lang="en-US" i="1" dirty="0">
+                <a:highlight>
+                  <a:srgbClr val="FFFF00"/>
+                </a:highlight>
+              </a:rPr>
               <a:t>Writing new code while you are unable to compile and test can be very unproductive</a:t>
             </a:r>
           </a:p>
           <a:p>
             <a:r>
-              <a:rPr lang="en-US" dirty="0"/>
+              <a:rPr lang="en-US" dirty="0">
+                <a:highlight>
+                  <a:srgbClr val="00FF00"/>
+                </a:highlight>
+              </a:rPr>
               <a:t>Add and commit the files to version control</a:t>
             </a:r>
           </a:p>
@@ -8781,19 +8801,35 @@
           <a:p>
             <a:pPr lvl="1"/>
             <a:r>
-              <a:rPr lang="en-US" dirty="0"/>
+              <a:rPr lang="en-US" dirty="0">
+                <a:highlight>
+                  <a:srgbClr val="00FF00"/>
+                </a:highlight>
+              </a:rPr>
               <a:t>Implement </a:t>
             </a:r>
             <a:r>
-              <a:rPr lang="en-US" dirty="0" err="1"/>
+              <a:rPr lang="en-US" dirty="0" err="1">
+                <a:highlight>
+                  <a:srgbClr val="00FF00"/>
+                </a:highlight>
+              </a:rPr>
               <a:t>MeshCreate</a:t>
             </a:r>
-            <a:endParaRPr lang="en-US" dirty="0"/>
+            <a:endParaRPr lang="en-US" dirty="0">
+              <a:highlight>
+                <a:srgbClr val="00FF00"/>
+              </a:highlight>
+            </a:endParaRPr>
           </a:p>
           <a:p>
             <a:pPr lvl="2"/>
             <a:r>
-              <a:rPr lang="en-US" dirty="0"/>
+              <a:rPr lang="en-US" dirty="0">
+                <a:highlight>
+                  <a:srgbClr val="FFFF00"/>
+                </a:highlight>
+              </a:rPr>
               <a:t>Test to make sure the memory is allocated correctly</a:t>
             </a:r>
           </a:p>

</xml_diff>

<commit_message>
📄 update Project 2 instructions
</commit_message>
<xml_diff>
--- a/Project2-Lecture.pptx
+++ b/Project2-Lecture.pptx
@@ -256,7 +256,7 @@
             <a:fld id="{9CE4D9B5-C23F-4F5B-A510-223EE943FD84}" type="datetimeFigureOut">
               <a:rPr lang="en-US" smtClean="0"/>
               <a:pPr/>
-              <a:t>1/23/2025</a:t>
+              <a:t>1/24/2025</a:t>
             </a:fld>
             <a:endParaRPr lang="en-US"/>
           </a:p>
@@ -843,7 +843,7 @@
             <a:fld id="{CC5FAB66-F69F-4B6C-B526-16B5B129EADB}" type="datetime1">
               <a:rPr lang="en-US" smtClean="0"/>
               <a:pPr/>
-              <a:t>1/23/2025</a:t>
+              <a:t>1/24/2025</a:t>
             </a:fld>
             <a:endParaRPr lang="en-US" dirty="0"/>
           </a:p>
@@ -1247,7 +1247,7 @@
             <a:fld id="{818F3258-39DB-480D-AA11-E1EF94FC4695}" type="datetime1">
               <a:rPr lang="en-US" smtClean="0"/>
               <a:pPr/>
-              <a:t>1/23/2025</a:t>
+              <a:t>1/24/2025</a:t>
             </a:fld>
             <a:endParaRPr lang="en-US" dirty="0"/>
           </a:p>
@@ -1425,7 +1425,7 @@
             <a:fld id="{AEC8A4F3-ED06-48DC-8481-6B075B3F12EC}" type="datetime1">
               <a:rPr lang="en-US" smtClean="0"/>
               <a:pPr/>
-              <a:t>1/23/2025</a:t>
+              <a:t>1/24/2025</a:t>
             </a:fld>
             <a:endParaRPr lang="en-US" dirty="0"/>
           </a:p>
@@ -1689,7 +1689,7 @@
             <a:fld id="{409124BB-FC4B-4459-9E83-B488936AD7B8}" type="datetime1">
               <a:rPr lang="en-US" smtClean="0"/>
               <a:pPr/>
-              <a:t>1/23/2025</a:t>
+              <a:t>1/24/2025</a:t>
             </a:fld>
             <a:endParaRPr lang="en-US" dirty="0"/>
           </a:p>
@@ -2059,7 +2059,7 @@
             <a:fld id="{AE645E34-4EAE-44C6-A808-8E7619B5FCEA}" type="datetime1">
               <a:rPr lang="en-US" smtClean="0"/>
               <a:pPr/>
-              <a:t>1/23/2025</a:t>
+              <a:t>1/24/2025</a:t>
             </a:fld>
             <a:endParaRPr lang="en-US" dirty="0"/>
           </a:p>
@@ -2429,7 +2429,7 @@
             <a:fld id="{7EC34C66-FE28-425E-8208-CF7EDC8DF363}" type="datetime1">
               <a:rPr lang="en-US" smtClean="0"/>
               <a:pPr/>
-              <a:t>1/23/2025</a:t>
+              <a:t>1/24/2025</a:t>
             </a:fld>
             <a:endParaRPr lang="en-US" dirty="0"/>
           </a:p>
@@ -2780,7 +2780,7 @@
             <a:fld id="{0444DE73-A3F0-436D-9600-1A6E66F9FFEF}" type="datetime1">
               <a:rPr lang="en-US" smtClean="0"/>
               <a:pPr/>
-              <a:t>1/23/2025</a:t>
+              <a:t>1/24/2025</a:t>
             </a:fld>
             <a:endParaRPr lang="en-US" dirty="0"/>
           </a:p>
@@ -3062,7 +3062,7 @@
             <a:fld id="{FF58DBF8-50A7-4BC0-9320-D3D97C2642BE}" type="datetime1">
               <a:rPr lang="en-US" smtClean="0"/>
               <a:pPr/>
-              <a:t>1/23/2025</a:t>
+              <a:t>1/24/2025</a:t>
             </a:fld>
             <a:endParaRPr lang="en-US" dirty="0"/>
           </a:p>
@@ -3448,7 +3448,7 @@
             <a:fld id="{3B7CFFA9-120C-49D9-8B33-3C2B12A8DBA4}" type="datetime1">
               <a:rPr lang="en-US" smtClean="0"/>
               <a:pPr/>
-              <a:t>1/23/2025</a:t>
+              <a:t>1/24/2025</a:t>
             </a:fld>
             <a:endParaRPr lang="en-US" dirty="0"/>
           </a:p>
@@ -3574,7 +3574,7 @@
             <a:fld id="{5F74FA30-5998-4A94-AC07-116568D8E4BB}" type="datetime1">
               <a:rPr lang="en-US" smtClean="0"/>
               <a:pPr/>
-              <a:t>1/23/2025</a:t>
+              <a:t>1/24/2025</a:t>
             </a:fld>
             <a:endParaRPr lang="en-US" dirty="0"/>
           </a:p>
@@ -3753,7 +3753,7 @@
             <a:fld id="{7B0B7851-DAC7-4535-82A8-F9F52B85F021}" type="datetime1">
               <a:rPr lang="en-US" smtClean="0"/>
               <a:pPr/>
-              <a:t>1/23/2025</a:t>
+              <a:t>1/24/2025</a:t>
             </a:fld>
             <a:endParaRPr lang="en-US" dirty="0"/>
           </a:p>
@@ -4115,7 +4115,7 @@
             <a:fld id="{58E9D1BF-3D47-4605-A719-999F5E730F58}" type="datetime1">
               <a:rPr lang="en-US" smtClean="0"/>
               <a:pPr/>
-              <a:t>1/23/2025</a:t>
+              <a:t>1/24/2025</a:t>
             </a:fld>
             <a:endParaRPr lang="en-US" dirty="0"/>
           </a:p>
@@ -4429,7 +4429,7 @@
             <a:fld id="{7832CE81-818F-4867-A81A-32FEBE6C803F}" type="datetime1">
               <a:rPr lang="en-US" smtClean="0"/>
               <a:pPr/>
-              <a:t>1/23/2025</a:t>
+              <a:t>1/24/2025</a:t>
             </a:fld>
             <a:endParaRPr lang="en-US" dirty="0"/>
           </a:p>
@@ -8922,26 +8922,46 @@
           <a:p>
             <a:pPr lvl="1"/>
             <a:r>
-              <a:rPr lang="en-US" dirty="0"/>
+              <a:rPr lang="en-US" dirty="0">
+                <a:highlight>
+                  <a:srgbClr val="00FF00"/>
+                </a:highlight>
+              </a:rPr>
               <a:t>Implement </a:t>
             </a:r>
             <a:r>
-              <a:rPr lang="en-US" dirty="0" err="1"/>
+              <a:rPr lang="en-US" dirty="0" err="1">
+                <a:highlight>
+                  <a:srgbClr val="00FF00"/>
+                </a:highlight>
+              </a:rPr>
               <a:t>MeshRender</a:t>
             </a:r>
-            <a:endParaRPr lang="en-US" dirty="0"/>
+            <a:endParaRPr lang="en-US" dirty="0">
+              <a:highlight>
+                <a:srgbClr val="00FF00"/>
+              </a:highlight>
+            </a:endParaRPr>
           </a:p>
           <a:p>
             <a:pPr lvl="2"/>
             <a:r>
-              <a:rPr lang="en-US" dirty="0"/>
+              <a:rPr lang="en-US" dirty="0">
+                <a:highlight>
+                  <a:srgbClr val="FFFF00"/>
+                </a:highlight>
+              </a:rPr>
               <a:t>Test to see if a colored mesh is displayed correctly on screen</a:t>
             </a:r>
           </a:p>
           <a:p>
             <a:pPr lvl="3"/>
             <a:r>
-              <a:rPr lang="en-US" dirty="0"/>
+              <a:rPr lang="en-US" dirty="0">
+                <a:highlight>
+                  <a:srgbClr val="00FF00"/>
+                </a:highlight>
+              </a:rPr>
               <a:t>You will need to add test code to Level1SceneUpdate</a:t>
             </a:r>
           </a:p>

</xml_diff>

<commit_message>
🧠 add SpriteCreate() logic
</commit_message>
<xml_diff>
--- a/Project2-Lecture.pptx
+++ b/Project2-Lecture.pptx
@@ -9148,49 +9148,77 @@
           <a:p>
             <a:pPr lvl="1"/>
             <a:r>
-              <a:rPr lang="en-US" dirty="0"/>
+              <a:rPr lang="en-US" dirty="0">
+                <a:highlight>
+                  <a:srgbClr val="00FF00"/>
+                </a:highlight>
+              </a:rPr>
               <a:t>Implement the Create function</a:t>
             </a:r>
           </a:p>
           <a:p>
             <a:pPr lvl="2"/>
             <a:r>
-              <a:rPr lang="en-US" dirty="0"/>
+              <a:rPr lang="en-US" dirty="0">
+                <a:highlight>
+                  <a:srgbClr val="FFFF00"/>
+                </a:highlight>
+              </a:rPr>
               <a:t>Test to make sure that the object is constructed properly</a:t>
             </a:r>
           </a:p>
           <a:p>
             <a:pPr lvl="1"/>
             <a:r>
-              <a:rPr lang="en-US" dirty="0"/>
+              <a:rPr lang="en-US" dirty="0">
+                <a:highlight>
+                  <a:srgbClr val="00FF00"/>
+                </a:highlight>
+              </a:rPr>
               <a:t>Implement the Free function</a:t>
             </a:r>
           </a:p>
           <a:p>
             <a:pPr lvl="2"/>
             <a:r>
-              <a:rPr lang="en-US" dirty="0"/>
+              <a:rPr lang="en-US" dirty="0">
+                <a:highlight>
+                  <a:srgbClr val="FFFF00"/>
+                </a:highlight>
+              </a:rPr>
               <a:t>Test to make sure that the object is freed properly</a:t>
             </a:r>
           </a:p>
           <a:p>
             <a:pPr lvl="2"/>
             <a:r>
-              <a:rPr lang="en-US" dirty="0"/>
+              <a:rPr lang="en-US" dirty="0">
+                <a:highlight>
+                  <a:srgbClr val="FFFF00"/>
+                </a:highlight>
+              </a:rPr>
               <a:t>Test to make sure that the original pointer is set to NULL</a:t>
             </a:r>
           </a:p>
           <a:p>
             <a:pPr lvl="1"/>
             <a:r>
-              <a:rPr lang="en-US" dirty="0"/>
+              <a:rPr lang="en-US" dirty="0">
+                <a:highlight>
+                  <a:srgbClr val="00FF00"/>
+                </a:highlight>
+              </a:rPr>
               <a:t>Implement the Get and Set functions</a:t>
             </a:r>
           </a:p>
           <a:p>
             <a:pPr lvl="2"/>
             <a:r>
-              <a:rPr lang="en-US" dirty="0"/>
+              <a:rPr lang="en-US" dirty="0">
+                <a:highlight>
+                  <a:srgbClr val="FFFF00"/>
+                </a:highlight>
+              </a:rPr>
               <a:t>Test to make sure that values are written and read properly</a:t>
             </a:r>
           </a:p>

</xml_diff>

<commit_message>
🧠 add SpriteSetMesh() logic
</commit_message>
<xml_diff>
--- a/Project2-Lecture.pptx
+++ b/Project2-Lecture.pptx
@@ -9390,35 +9390,55 @@
           <a:p>
             <a:pPr lvl="1"/>
             <a:r>
-              <a:rPr lang="en-US" dirty="0"/>
+              <a:rPr lang="en-US" dirty="0">
+                <a:highlight>
+                  <a:srgbClr val="00FF00"/>
+                </a:highlight>
+              </a:rPr>
               <a:t>Implement the Create function</a:t>
             </a:r>
           </a:p>
           <a:p>
             <a:pPr lvl="2"/>
             <a:r>
-              <a:rPr lang="en-US" dirty="0"/>
+              <a:rPr lang="en-US" dirty="0">
+                <a:highlight>
+                  <a:srgbClr val="FFFF00"/>
+                </a:highlight>
+              </a:rPr>
               <a:t>Test to make sure that the object is constructed properly</a:t>
             </a:r>
           </a:p>
           <a:p>
             <a:pPr lvl="1"/>
             <a:r>
-              <a:rPr lang="en-US" dirty="0"/>
+              <a:rPr lang="en-US" dirty="0">
+                <a:highlight>
+                  <a:srgbClr val="00FF00"/>
+                </a:highlight>
+              </a:rPr>
               <a:t>Implement the Free function</a:t>
             </a:r>
           </a:p>
           <a:p>
             <a:pPr lvl="2"/>
             <a:r>
-              <a:rPr lang="en-US" dirty="0"/>
+              <a:rPr lang="en-US" dirty="0">
+                <a:highlight>
+                  <a:srgbClr val="FFFF00"/>
+                </a:highlight>
+              </a:rPr>
               <a:t>Test to make sure that the object is freed properly</a:t>
             </a:r>
           </a:p>
           <a:p>
             <a:pPr lvl="2"/>
             <a:r>
-              <a:rPr lang="en-US" dirty="0"/>
+              <a:rPr lang="en-US" dirty="0">
+                <a:highlight>
+                  <a:srgbClr val="FFFF00"/>
+                </a:highlight>
+              </a:rPr>
               <a:t>Test to make sure that the original pointer is set to NULL</a:t>
             </a:r>
           </a:p>
@@ -9447,15 +9467,27 @@
           <a:p>
             <a:pPr lvl="2"/>
             <a:r>
-              <a:rPr lang="en-US" dirty="0"/>
+              <a:rPr lang="en-US" dirty="0">
+                <a:highlight>
+                  <a:srgbClr val="FFFF00"/>
+                </a:highlight>
+              </a:rPr>
               <a:t>Use the </a:t>
             </a:r>
             <a:r>
-              <a:rPr lang="en-US" dirty="0" err="1"/>
+              <a:rPr lang="en-US" dirty="0" err="1">
+                <a:highlight>
+                  <a:srgbClr val="FFFF00"/>
+                </a:highlight>
+              </a:rPr>
               <a:t>MeshRender</a:t>
             </a:r>
             <a:r>
-              <a:rPr lang="en-US" dirty="0"/>
+              <a:rPr lang="en-US" dirty="0">
+                <a:highlight>
+                  <a:srgbClr val="FFFF00"/>
+                </a:highlight>
+              </a:rPr>
               <a:t> function for this purpose</a:t>
             </a:r>
           </a:p>

</xml_diff>

<commit_message>
🧠 implement void SpriteRender(const Sprite* sprite, Transform* transform)
</commit_message>
<xml_diff>
--- a/Project2-Lecture.pptx
+++ b/Project2-Lecture.pptx
@@ -9445,22 +9445,38 @@
           <a:p>
             <a:pPr lvl="1"/>
             <a:r>
-              <a:rPr lang="en-US" dirty="0"/>
+              <a:rPr lang="en-US" dirty="0">
+                <a:highlight>
+                  <a:srgbClr val="00FF00"/>
+                </a:highlight>
+              </a:rPr>
               <a:t>Implement the </a:t>
             </a:r>
             <a:r>
-              <a:rPr lang="en-US" dirty="0" err="1"/>
+              <a:rPr lang="en-US" dirty="0" err="1">
+                <a:highlight>
+                  <a:srgbClr val="00FF00"/>
+                </a:highlight>
+              </a:rPr>
               <a:t>SetMesh</a:t>
             </a:r>
             <a:r>
-              <a:rPr lang="en-US" dirty="0"/>
+              <a:rPr lang="en-US" dirty="0">
+                <a:highlight>
+                  <a:srgbClr val="00FF00"/>
+                </a:highlight>
+              </a:rPr>
               <a:t> function</a:t>
             </a:r>
           </a:p>
           <a:p>
             <a:pPr lvl="1"/>
             <a:r>
-              <a:rPr lang="en-US" dirty="0"/>
+              <a:rPr lang="en-US" dirty="0">
+                <a:highlight>
+                  <a:srgbClr val="00FF00"/>
+                </a:highlight>
+              </a:rPr>
               <a:t>Implement the Render function to draw a colored mesh</a:t>
             </a:r>
           </a:p>

</xml_diff>

<commit_message>
🧠 Implement the Create, Free, and LoadTexture functions
</commit_message>
<xml_diff>
--- a/Project2-Lecture.pptx
+++ b/Project2-Lecture.pptx
@@ -9510,19 +9510,35 @@
           <a:p>
             <a:pPr lvl="1"/>
             <a:r>
-              <a:rPr lang="en-US" dirty="0"/>
+              <a:rPr lang="en-US" dirty="0">
+                <a:highlight>
+                  <a:srgbClr val="FF0000"/>
+                </a:highlight>
+              </a:rPr>
               <a:t>Modify the test code in Level 1 to call </a:t>
             </a:r>
             <a:r>
-              <a:rPr lang="en-US" dirty="0" err="1"/>
+              <a:rPr lang="en-US" dirty="0" err="1">
+                <a:highlight>
+                  <a:srgbClr val="FF0000"/>
+                </a:highlight>
+              </a:rPr>
               <a:t>SpriteRender</a:t>
             </a:r>
-            <a:endParaRPr lang="en-US" dirty="0"/>
+            <a:endParaRPr lang="en-US" dirty="0">
+              <a:highlight>
+                <a:srgbClr val="FF0000"/>
+              </a:highlight>
+            </a:endParaRPr>
           </a:p>
           <a:p>
             <a:pPr lvl="1"/>
             <a:r>
-              <a:rPr lang="en-US" dirty="0"/>
+              <a:rPr lang="en-US" dirty="0">
+                <a:highlight>
+                  <a:srgbClr val="FF0000"/>
+                </a:highlight>
+              </a:rPr>
               <a:t>Verify that a colored mesh is displayed</a:t>
             </a:r>
           </a:p>
@@ -9694,11 +9710,19 @@
           <a:p>
             <a:pPr lvl="1"/>
             <a:r>
-              <a:rPr lang="en-US" dirty="0"/>
+              <a:rPr lang="en-US" dirty="0">
+                <a:highlight>
+                  <a:srgbClr val="00FF00"/>
+                </a:highlight>
+              </a:rPr>
               <a:t>Implement the Create, Free, </a:t>
             </a:r>
             <a:r>
-              <a:rPr lang="en-US" dirty="0" err="1"/>
+              <a:rPr lang="en-US" dirty="0" err="1">
+                <a:highlight>
+                  <a:srgbClr val="00FF00"/>
+                </a:highlight>
+              </a:rPr>
               <a:t>LoadTexture</a:t>
             </a:r>
             <a:r>
@@ -9725,21 +9749,37 @@
           <a:p>
             <a:pPr lvl="2"/>
             <a:r>
-              <a:rPr lang="en-US" dirty="0"/>
+              <a:rPr lang="en-US" dirty="0">
+                <a:highlight>
+                  <a:srgbClr val="FFFF00"/>
+                </a:highlight>
+              </a:rPr>
               <a:t>Test to make sure the object is constructed and freed properly</a:t>
             </a:r>
           </a:p>
           <a:p>
             <a:pPr lvl="1"/>
             <a:r>
-              <a:rPr lang="en-US" dirty="0"/>
+              <a:rPr lang="en-US" dirty="0">
+                <a:highlight>
+                  <a:srgbClr val="FF0000"/>
+                </a:highlight>
+              </a:rPr>
               <a:t>Add function calls to Level 1 and </a:t>
             </a:r>
             <a:r>
-              <a:rPr lang="en-US" dirty="0" err="1"/>
+              <a:rPr lang="en-US" dirty="0" err="1">
+                <a:highlight>
+                  <a:srgbClr val="FF0000"/>
+                </a:highlight>
+              </a:rPr>
               <a:t>Sprite.c</a:t>
             </a:r>
-            <a:endParaRPr lang="en-US" dirty="0"/>
+            <a:endParaRPr lang="en-US" dirty="0">
+              <a:highlight>
+                <a:srgbClr val="FF0000"/>
+              </a:highlight>
+            </a:endParaRPr>
           </a:p>
           <a:p>
             <a:r>

</xml_diff>

<commit_message>
🧠 implement Physics.c functions
PhysicsCreate, PhysicsFree, PhysicsRead, PhysicsGetAcceleration, PhysicsGetVelocity, PhysicsGetOldTranslation, PhysicsSetAcceleration, PhysicsSetVelocity, and PhysicsUpdate
</commit_message>
<xml_diff>
--- a/Project2-Lecture.pptx
+++ b/Project2-Lecture.pptx
@@ -256,7 +256,7 @@
             <a:fld id="{9CE4D9B5-C23F-4F5B-A510-223EE943FD84}" type="datetimeFigureOut">
               <a:rPr lang="en-US" smtClean="0"/>
               <a:pPr/>
-              <a:t>1/24/2025</a:t>
+              <a:t>1/28/2025</a:t>
             </a:fld>
             <a:endParaRPr lang="en-US"/>
           </a:p>
@@ -843,7 +843,7 @@
             <a:fld id="{CC5FAB66-F69F-4B6C-B526-16B5B129EADB}" type="datetime1">
               <a:rPr lang="en-US" smtClean="0"/>
               <a:pPr/>
-              <a:t>1/24/2025</a:t>
+              <a:t>1/28/2025</a:t>
             </a:fld>
             <a:endParaRPr lang="en-US" dirty="0"/>
           </a:p>
@@ -1247,7 +1247,7 @@
             <a:fld id="{818F3258-39DB-480D-AA11-E1EF94FC4695}" type="datetime1">
               <a:rPr lang="en-US" smtClean="0"/>
               <a:pPr/>
-              <a:t>1/24/2025</a:t>
+              <a:t>1/28/2025</a:t>
             </a:fld>
             <a:endParaRPr lang="en-US" dirty="0"/>
           </a:p>
@@ -1425,7 +1425,7 @@
             <a:fld id="{AEC8A4F3-ED06-48DC-8481-6B075B3F12EC}" type="datetime1">
               <a:rPr lang="en-US" smtClean="0"/>
               <a:pPr/>
-              <a:t>1/24/2025</a:t>
+              <a:t>1/28/2025</a:t>
             </a:fld>
             <a:endParaRPr lang="en-US" dirty="0"/>
           </a:p>
@@ -1689,7 +1689,7 @@
             <a:fld id="{409124BB-FC4B-4459-9E83-B488936AD7B8}" type="datetime1">
               <a:rPr lang="en-US" smtClean="0"/>
               <a:pPr/>
-              <a:t>1/24/2025</a:t>
+              <a:t>1/28/2025</a:t>
             </a:fld>
             <a:endParaRPr lang="en-US" dirty="0"/>
           </a:p>
@@ -2059,7 +2059,7 @@
             <a:fld id="{AE645E34-4EAE-44C6-A808-8E7619B5FCEA}" type="datetime1">
               <a:rPr lang="en-US" smtClean="0"/>
               <a:pPr/>
-              <a:t>1/24/2025</a:t>
+              <a:t>1/28/2025</a:t>
             </a:fld>
             <a:endParaRPr lang="en-US" dirty="0"/>
           </a:p>
@@ -2429,7 +2429,7 @@
             <a:fld id="{7EC34C66-FE28-425E-8208-CF7EDC8DF363}" type="datetime1">
               <a:rPr lang="en-US" smtClean="0"/>
               <a:pPr/>
-              <a:t>1/24/2025</a:t>
+              <a:t>1/28/2025</a:t>
             </a:fld>
             <a:endParaRPr lang="en-US" dirty="0"/>
           </a:p>
@@ -2780,7 +2780,7 @@
             <a:fld id="{0444DE73-A3F0-436D-9600-1A6E66F9FFEF}" type="datetime1">
               <a:rPr lang="en-US" smtClean="0"/>
               <a:pPr/>
-              <a:t>1/24/2025</a:t>
+              <a:t>1/28/2025</a:t>
             </a:fld>
             <a:endParaRPr lang="en-US" dirty="0"/>
           </a:p>
@@ -3062,7 +3062,7 @@
             <a:fld id="{FF58DBF8-50A7-4BC0-9320-D3D97C2642BE}" type="datetime1">
               <a:rPr lang="en-US" smtClean="0"/>
               <a:pPr/>
-              <a:t>1/24/2025</a:t>
+              <a:t>1/28/2025</a:t>
             </a:fld>
             <a:endParaRPr lang="en-US" dirty="0"/>
           </a:p>
@@ -3448,7 +3448,7 @@
             <a:fld id="{3B7CFFA9-120C-49D9-8B33-3C2B12A8DBA4}" type="datetime1">
               <a:rPr lang="en-US" smtClean="0"/>
               <a:pPr/>
-              <a:t>1/24/2025</a:t>
+              <a:t>1/28/2025</a:t>
             </a:fld>
             <a:endParaRPr lang="en-US" dirty="0"/>
           </a:p>
@@ -3574,7 +3574,7 @@
             <a:fld id="{5F74FA30-5998-4A94-AC07-116568D8E4BB}" type="datetime1">
               <a:rPr lang="en-US" smtClean="0"/>
               <a:pPr/>
-              <a:t>1/24/2025</a:t>
+              <a:t>1/28/2025</a:t>
             </a:fld>
             <a:endParaRPr lang="en-US" dirty="0"/>
           </a:p>
@@ -3753,7 +3753,7 @@
             <a:fld id="{7B0B7851-DAC7-4535-82A8-F9F52B85F021}" type="datetime1">
               <a:rPr lang="en-US" smtClean="0"/>
               <a:pPr/>
-              <a:t>1/24/2025</a:t>
+              <a:t>1/28/2025</a:t>
             </a:fld>
             <a:endParaRPr lang="en-US" dirty="0"/>
           </a:p>
@@ -4115,7 +4115,7 @@
             <a:fld id="{58E9D1BF-3D47-4605-A719-999F5E730F58}" type="datetime1">
               <a:rPr lang="en-US" smtClean="0"/>
               <a:pPr/>
-              <a:t>1/24/2025</a:t>
+              <a:t>1/28/2025</a:t>
             </a:fld>
             <a:endParaRPr lang="en-US" dirty="0"/>
           </a:p>
@@ -4429,7 +4429,7 @@
             <a:fld id="{7832CE81-818F-4867-A81A-32FEBE6C803F}" type="datetime1">
               <a:rPr lang="en-US" smtClean="0"/>
               <a:pPr/>
-              <a:t>1/24/2025</a:t>
+              <a:t>1/28/2025</a:t>
             </a:fld>
             <a:endParaRPr lang="en-US" dirty="0"/>
           </a:p>
@@ -5649,63 +5649,99 @@
           <a:p>
             <a:pPr lvl="1"/>
             <a:r>
-              <a:rPr lang="en-US" dirty="0"/>
+              <a:rPr lang="en-US" dirty="0">
+                <a:highlight>
+                  <a:srgbClr val="00FF00"/>
+                </a:highlight>
+              </a:rPr>
               <a:t>Implement the Create function</a:t>
             </a:r>
           </a:p>
           <a:p>
             <a:pPr lvl="2"/>
             <a:r>
-              <a:rPr lang="en-US" dirty="0"/>
+              <a:rPr lang="en-US" dirty="0">
+                <a:highlight>
+                  <a:srgbClr val="FFFF00"/>
+                </a:highlight>
+              </a:rPr>
               <a:t>Test to make sure that the object is constructed properly</a:t>
             </a:r>
           </a:p>
           <a:p>
             <a:pPr lvl="1"/>
             <a:r>
-              <a:rPr lang="en-US" dirty="0"/>
+              <a:rPr lang="en-US" dirty="0">
+                <a:highlight>
+                  <a:srgbClr val="00FF00"/>
+                </a:highlight>
+              </a:rPr>
               <a:t>Implement the Free function</a:t>
             </a:r>
           </a:p>
           <a:p>
             <a:pPr lvl="2"/>
             <a:r>
-              <a:rPr lang="en-US" dirty="0"/>
+              <a:rPr lang="en-US" dirty="0">
+                <a:highlight>
+                  <a:srgbClr val="FFFF00"/>
+                </a:highlight>
+              </a:rPr>
               <a:t>Test to make sure that the object is freed properly</a:t>
             </a:r>
           </a:p>
           <a:p>
             <a:pPr lvl="2"/>
             <a:r>
-              <a:rPr lang="en-US" dirty="0"/>
+              <a:rPr lang="en-US" dirty="0">
+                <a:highlight>
+                  <a:srgbClr val="FFFF00"/>
+                </a:highlight>
+              </a:rPr>
               <a:t>Test to make sure that the original pointer is set to NULL</a:t>
             </a:r>
           </a:p>
           <a:p>
             <a:pPr lvl="1"/>
             <a:r>
-              <a:rPr lang="en-US" dirty="0"/>
+              <a:rPr lang="en-US" dirty="0">
+                <a:highlight>
+                  <a:srgbClr val="00FF00"/>
+                </a:highlight>
+              </a:rPr>
               <a:t>Implement the Get and Set functions</a:t>
             </a:r>
           </a:p>
           <a:p>
             <a:pPr lvl="2"/>
             <a:r>
-              <a:rPr lang="en-US" dirty="0"/>
+              <a:rPr lang="en-US" dirty="0">
+                <a:highlight>
+                  <a:srgbClr val="FFFF00"/>
+                </a:highlight>
+              </a:rPr>
               <a:t>Test to make sure that values are written and read properly</a:t>
             </a:r>
           </a:p>
           <a:p>
             <a:pPr lvl="1"/>
             <a:r>
-              <a:rPr lang="en-US" dirty="0"/>
+              <a:rPr lang="en-US" dirty="0">
+                <a:highlight>
+                  <a:srgbClr val="00FF00"/>
+                </a:highlight>
+              </a:rPr>
               <a:t>Implement the Update function</a:t>
             </a:r>
           </a:p>
           <a:p>
             <a:pPr lvl="2"/>
             <a:r>
-              <a:rPr lang="en-US" dirty="0"/>
+              <a:rPr lang="en-US" dirty="0">
+                <a:highlight>
+                  <a:srgbClr val="FFFF00"/>
+                </a:highlight>
+              </a:rPr>
               <a:t>Update the test code to move an object using velocity</a:t>
             </a:r>
           </a:p>
@@ -9512,7 +9548,7 @@
             <a:r>
               <a:rPr lang="en-US" dirty="0">
                 <a:highlight>
-                  <a:srgbClr val="FF0000"/>
+                  <a:srgbClr val="00FF00"/>
                 </a:highlight>
               </a:rPr>
               <a:t>Modify the test code in Level 1 to call </a:t>
@@ -9520,14 +9556,14 @@
             <a:r>
               <a:rPr lang="en-US" dirty="0" err="1">
                 <a:highlight>
-                  <a:srgbClr val="FF0000"/>
+                  <a:srgbClr val="00FF00"/>
                 </a:highlight>
               </a:rPr>
               <a:t>SpriteRender</a:t>
             </a:r>
             <a:endParaRPr lang="en-US" dirty="0">
               <a:highlight>
-                <a:srgbClr val="FF0000"/>
+                <a:srgbClr val="00FF00"/>
               </a:highlight>
             </a:endParaRPr>
           </a:p>
@@ -9536,7 +9572,7 @@
             <a:r>
               <a:rPr lang="en-US" dirty="0">
                 <a:highlight>
-                  <a:srgbClr val="FF0000"/>
+                  <a:srgbClr val="00FF00"/>
                 </a:highlight>
               </a:rPr>
               <a:t>Verify that a colored mesh is displayed</a:t>
@@ -9726,23 +9762,43 @@
               <a:t>LoadTexture</a:t>
             </a:r>
             <a:r>
-              <a:rPr lang="en-US" dirty="0"/>
+              <a:rPr lang="en-US" dirty="0">
+                <a:highlight>
+                  <a:srgbClr val="00FF00"/>
+                </a:highlight>
+              </a:rPr>
               <a:t>, </a:t>
             </a:r>
             <a:r>
-              <a:rPr lang="en-US" dirty="0" err="1"/>
+              <a:rPr lang="en-US" dirty="0" err="1">
+                <a:highlight>
+                  <a:srgbClr val="00FF00"/>
+                </a:highlight>
+              </a:rPr>
               <a:t>SetTexture</a:t>
             </a:r>
             <a:r>
-              <a:rPr lang="en-US" dirty="0"/>
+              <a:rPr lang="en-US" dirty="0">
+                <a:highlight>
+                  <a:srgbClr val="00FF00"/>
+                </a:highlight>
+              </a:rPr>
               <a:t>, and </a:t>
             </a:r>
             <a:r>
-              <a:rPr lang="en-US" dirty="0" err="1"/>
+              <a:rPr lang="en-US" dirty="0" err="1">
+                <a:highlight>
+                  <a:srgbClr val="00FF00"/>
+                </a:highlight>
+              </a:rPr>
               <a:t>SetTextureOffset</a:t>
             </a:r>
             <a:r>
-              <a:rPr lang="en-US" dirty="0"/>
+              <a:rPr lang="en-US" dirty="0">
+                <a:highlight>
+                  <a:srgbClr val="00FF00"/>
+                </a:highlight>
+              </a:rPr>
               <a:t> functions</a:t>
             </a:r>
           </a:p>
@@ -9791,37 +9847,65 @@
           <a:p>
             <a:pPr lvl="1"/>
             <a:r>
-              <a:rPr lang="en-US" dirty="0"/>
+              <a:rPr lang="en-US" dirty="0">
+                <a:highlight>
+                  <a:srgbClr val="00FF00"/>
+                </a:highlight>
+              </a:rPr>
               <a:t>Modify the Render function to </a:t>
             </a:r>
             <a:r>
-              <a:rPr lang="en-US" i="1" dirty="0"/>
+              <a:rPr lang="en-US" i="1" dirty="0">
+                <a:highlight>
+                  <a:srgbClr val="00FF00"/>
+                </a:highlight>
+              </a:rPr>
               <a:t>also</a:t>
             </a:r>
             <a:r>
-              <a:rPr lang="en-US" dirty="0"/>
+              <a:rPr lang="en-US" dirty="0">
+                <a:highlight>
+                  <a:srgbClr val="00FF00"/>
+                </a:highlight>
+              </a:rPr>
               <a:t> handle textures</a:t>
             </a:r>
           </a:p>
           <a:p>
             <a:pPr lvl="1"/>
             <a:r>
-              <a:rPr lang="en-US" dirty="0"/>
+              <a:rPr lang="en-US" dirty="0">
+                <a:highlight>
+                  <a:srgbClr val="FFFF00"/>
+                </a:highlight>
+              </a:rPr>
               <a:t>Verify that a textured mesh is displayed</a:t>
             </a:r>
           </a:p>
           <a:p>
             <a:pPr lvl="1"/>
             <a:r>
-              <a:rPr lang="en-US" dirty="0"/>
+              <a:rPr lang="en-US" dirty="0">
+                <a:highlight>
+                  <a:srgbClr val="FFFF00"/>
+                </a:highlight>
+              </a:rPr>
               <a:t>Temporarily disable the </a:t>
             </a:r>
             <a:r>
-              <a:rPr lang="en-US" dirty="0" err="1"/>
+              <a:rPr lang="en-US" dirty="0" err="1">
+                <a:highlight>
+                  <a:srgbClr val="FFFF00"/>
+                </a:highlight>
+              </a:rPr>
               <a:t>SetSpriteSource</a:t>
             </a:r>
             <a:r>
-              <a:rPr lang="en-US" dirty="0"/>
+              <a:rPr lang="en-US" dirty="0">
+                <a:highlight>
+                  <a:srgbClr val="FFFF00"/>
+                </a:highlight>
+              </a:rPr>
               <a:t> function call and verify that colored meshes are still displayed properly</a:t>
             </a:r>
           </a:p>
@@ -9993,23 +10077,43 @@
           <a:p>
             <a:pPr lvl="1"/>
             <a:r>
-              <a:rPr lang="en-US" dirty="0"/>
+              <a:rPr lang="en-US" dirty="0">
+                <a:highlight>
+                  <a:srgbClr val="00FF00"/>
+                </a:highlight>
+              </a:rPr>
               <a:t>Implement the </a:t>
             </a:r>
             <a:r>
-              <a:rPr lang="en-US" dirty="0" err="1"/>
+              <a:rPr lang="en-US" dirty="0" err="1">
+                <a:highlight>
+                  <a:srgbClr val="00FF00"/>
+                </a:highlight>
+              </a:rPr>
               <a:t>GetFrameCount</a:t>
             </a:r>
             <a:r>
-              <a:rPr lang="en-US" dirty="0"/>
+              <a:rPr lang="en-US" dirty="0">
+                <a:highlight>
+                  <a:srgbClr val="00FF00"/>
+                </a:highlight>
+              </a:rPr>
               <a:t> and </a:t>
             </a:r>
             <a:r>
-              <a:rPr lang="en-US" dirty="0" err="1"/>
+              <a:rPr lang="en-US" dirty="0" err="1">
+                <a:highlight>
+                  <a:srgbClr val="00FF00"/>
+                </a:highlight>
+              </a:rPr>
               <a:t>GetUV</a:t>
             </a:r>
             <a:r>
-              <a:rPr lang="en-US" dirty="0"/>
+              <a:rPr lang="en-US" dirty="0">
+                <a:highlight>
+                  <a:srgbClr val="00FF00"/>
+                </a:highlight>
+              </a:rPr>
               <a:t> functions</a:t>
             </a:r>
           </a:p>
@@ -10023,66 +10127,114 @@
           <a:p>
             <a:pPr lvl="1"/>
             <a:r>
-              <a:rPr lang="en-US" dirty="0"/>
+              <a:rPr lang="en-US" dirty="0">
+                <a:highlight>
+                  <a:srgbClr val="00FF00"/>
+                </a:highlight>
+              </a:rPr>
               <a:t>Implement the </a:t>
             </a:r>
             <a:r>
-              <a:rPr lang="en-US" dirty="0" err="1"/>
+              <a:rPr lang="en-US" dirty="0" err="1">
+                <a:highlight>
+                  <a:srgbClr val="00FF00"/>
+                </a:highlight>
+              </a:rPr>
               <a:t>SetFrame</a:t>
             </a:r>
             <a:r>
-              <a:rPr lang="en-US" dirty="0"/>
+              <a:rPr lang="en-US" dirty="0">
+                <a:highlight>
+                  <a:srgbClr val="00FF00"/>
+                </a:highlight>
+              </a:rPr>
               <a:t> function</a:t>
             </a:r>
           </a:p>
           <a:p>
             <a:pPr lvl="2"/>
             <a:r>
-              <a:rPr lang="en-US" dirty="0"/>
+              <a:rPr lang="en-US" dirty="0">
+                <a:highlight>
+                  <a:srgbClr val="00FF00"/>
+                </a:highlight>
+              </a:rPr>
               <a:t>Make sure to write the trace message</a:t>
             </a:r>
           </a:p>
           <a:p>
             <a:pPr lvl="1"/>
             <a:r>
-              <a:rPr lang="en-US" dirty="0"/>
+              <a:rPr lang="en-US" dirty="0">
+                <a:highlight>
+                  <a:srgbClr val="FF0000"/>
+                </a:highlight>
+              </a:rPr>
               <a:t>Temporarily add a </a:t>
             </a:r>
             <a:r>
-              <a:rPr lang="en-US" dirty="0" err="1"/>
+              <a:rPr lang="en-US" dirty="0" err="1">
+                <a:highlight>
+                  <a:srgbClr val="FF0000"/>
+                </a:highlight>
+              </a:rPr>
               <a:t>SetFrame</a:t>
             </a:r>
             <a:r>
-              <a:rPr lang="en-US" dirty="0"/>
+              <a:rPr lang="en-US" dirty="0">
+                <a:highlight>
+                  <a:srgbClr val="FF0000"/>
+                </a:highlight>
+              </a:rPr>
               <a:t> function call to Level 1</a:t>
             </a:r>
           </a:p>
           <a:p>
             <a:pPr lvl="2"/>
             <a:r>
-              <a:rPr lang="en-US" dirty="0"/>
+              <a:rPr lang="en-US" dirty="0">
+                <a:highlight>
+                  <a:srgbClr val="FFFF00"/>
+                </a:highlight>
+              </a:rPr>
               <a:t>Currently, the only valid value for </a:t>
             </a:r>
             <a:r>
-              <a:rPr lang="en-US" dirty="0" err="1"/>
+              <a:rPr lang="en-US" dirty="0" err="1">
+                <a:highlight>
+                  <a:srgbClr val="FFFF00"/>
+                </a:highlight>
+              </a:rPr>
               <a:t>frameIndex</a:t>
             </a:r>
             <a:r>
-              <a:rPr lang="en-US" dirty="0"/>
+              <a:rPr lang="en-US" dirty="0">
+                <a:highlight>
+                  <a:srgbClr val="FFFF00"/>
+                </a:highlight>
+              </a:rPr>
               <a:t> should be 0</a:t>
             </a:r>
           </a:p>
           <a:p>
             <a:pPr lvl="2"/>
             <a:r>
-              <a:rPr lang="en-US" dirty="0"/>
+              <a:rPr lang="en-US" dirty="0">
+                <a:highlight>
+                  <a:srgbClr val="FFFF00"/>
+                </a:highlight>
+              </a:rPr>
               <a:t>Try testing with values of 1 and -1 to see what will happen</a:t>
             </a:r>
           </a:p>
           <a:p>
             <a:pPr lvl="1"/>
             <a:r>
-              <a:rPr lang="en-US" dirty="0"/>
+              <a:rPr lang="en-US" dirty="0">
+                <a:highlight>
+                  <a:srgbClr val="FF0000"/>
+                </a:highlight>
+              </a:rPr>
               <a:t>Verify that this new trace message is written to the log file</a:t>
             </a:r>
           </a:p>

</xml_diff>

<commit_message>
✨ implement EntityRead and related functions
</commit_message>
<xml_diff>
--- a/Project2-Lecture.pptx
+++ b/Project2-Lecture.pptx
@@ -256,7 +256,7 @@
             <a:fld id="{9CE4D9B5-C23F-4F5B-A510-223EE943FD84}" type="datetimeFigureOut">
               <a:rPr lang="en-US" smtClean="0"/>
               <a:pPr/>
-              <a:t>1/28/2025</a:t>
+              <a:t>1/29/2025</a:t>
             </a:fld>
             <a:endParaRPr lang="en-US"/>
           </a:p>
@@ -843,7 +843,7 @@
             <a:fld id="{CC5FAB66-F69F-4B6C-B526-16B5B129EADB}" type="datetime1">
               <a:rPr lang="en-US" smtClean="0"/>
               <a:pPr/>
-              <a:t>1/28/2025</a:t>
+              <a:t>1/29/2025</a:t>
             </a:fld>
             <a:endParaRPr lang="en-US" dirty="0"/>
           </a:p>
@@ -1247,7 +1247,7 @@
             <a:fld id="{818F3258-39DB-480D-AA11-E1EF94FC4695}" type="datetime1">
               <a:rPr lang="en-US" smtClean="0"/>
               <a:pPr/>
-              <a:t>1/28/2025</a:t>
+              <a:t>1/29/2025</a:t>
             </a:fld>
             <a:endParaRPr lang="en-US" dirty="0"/>
           </a:p>
@@ -1425,7 +1425,7 @@
             <a:fld id="{AEC8A4F3-ED06-48DC-8481-6B075B3F12EC}" type="datetime1">
               <a:rPr lang="en-US" smtClean="0"/>
               <a:pPr/>
-              <a:t>1/28/2025</a:t>
+              <a:t>1/29/2025</a:t>
             </a:fld>
             <a:endParaRPr lang="en-US" dirty="0"/>
           </a:p>
@@ -1689,7 +1689,7 @@
             <a:fld id="{409124BB-FC4B-4459-9E83-B488936AD7B8}" type="datetime1">
               <a:rPr lang="en-US" smtClean="0"/>
               <a:pPr/>
-              <a:t>1/28/2025</a:t>
+              <a:t>1/29/2025</a:t>
             </a:fld>
             <a:endParaRPr lang="en-US" dirty="0"/>
           </a:p>
@@ -2059,7 +2059,7 @@
             <a:fld id="{AE645E34-4EAE-44C6-A808-8E7619B5FCEA}" type="datetime1">
               <a:rPr lang="en-US" smtClean="0"/>
               <a:pPr/>
-              <a:t>1/28/2025</a:t>
+              <a:t>1/29/2025</a:t>
             </a:fld>
             <a:endParaRPr lang="en-US" dirty="0"/>
           </a:p>
@@ -2429,7 +2429,7 @@
             <a:fld id="{7EC34C66-FE28-425E-8208-CF7EDC8DF363}" type="datetime1">
               <a:rPr lang="en-US" smtClean="0"/>
               <a:pPr/>
-              <a:t>1/28/2025</a:t>
+              <a:t>1/29/2025</a:t>
             </a:fld>
             <a:endParaRPr lang="en-US" dirty="0"/>
           </a:p>
@@ -2780,7 +2780,7 @@
             <a:fld id="{0444DE73-A3F0-436D-9600-1A6E66F9FFEF}" type="datetime1">
               <a:rPr lang="en-US" smtClean="0"/>
               <a:pPr/>
-              <a:t>1/28/2025</a:t>
+              <a:t>1/29/2025</a:t>
             </a:fld>
             <a:endParaRPr lang="en-US" dirty="0"/>
           </a:p>
@@ -3062,7 +3062,7 @@
             <a:fld id="{FF58DBF8-50A7-4BC0-9320-D3D97C2642BE}" type="datetime1">
               <a:rPr lang="en-US" smtClean="0"/>
               <a:pPr/>
-              <a:t>1/28/2025</a:t>
+              <a:t>1/29/2025</a:t>
             </a:fld>
             <a:endParaRPr lang="en-US" dirty="0"/>
           </a:p>
@@ -3448,7 +3448,7 @@
             <a:fld id="{3B7CFFA9-120C-49D9-8B33-3C2B12A8DBA4}" type="datetime1">
               <a:rPr lang="en-US" smtClean="0"/>
               <a:pPr/>
-              <a:t>1/28/2025</a:t>
+              <a:t>1/29/2025</a:t>
             </a:fld>
             <a:endParaRPr lang="en-US" dirty="0"/>
           </a:p>
@@ -3574,7 +3574,7 @@
             <a:fld id="{5F74FA30-5998-4A94-AC07-116568D8E4BB}" type="datetime1">
               <a:rPr lang="en-US" smtClean="0"/>
               <a:pPr/>
-              <a:t>1/28/2025</a:t>
+              <a:t>1/29/2025</a:t>
             </a:fld>
             <a:endParaRPr lang="en-US" dirty="0"/>
           </a:p>
@@ -3753,7 +3753,7 @@
             <a:fld id="{7B0B7851-DAC7-4535-82A8-F9F52B85F021}" type="datetime1">
               <a:rPr lang="en-US" smtClean="0"/>
               <a:pPr/>
-              <a:t>1/28/2025</a:t>
+              <a:t>1/29/2025</a:t>
             </a:fld>
             <a:endParaRPr lang="en-US" dirty="0"/>
           </a:p>
@@ -4115,7 +4115,7 @@
             <a:fld id="{58E9D1BF-3D47-4605-A719-999F5E730F58}" type="datetime1">
               <a:rPr lang="en-US" smtClean="0"/>
               <a:pPr/>
-              <a:t>1/28/2025</a:t>
+              <a:t>1/29/2025</a:t>
             </a:fld>
             <a:endParaRPr lang="en-US" dirty="0"/>
           </a:p>
@@ -4429,7 +4429,7 @@
             <a:fld id="{7832CE81-818F-4867-A81A-32FEBE6C803F}" type="datetime1">
               <a:rPr lang="en-US" smtClean="0"/>
               <a:pPr/>
-              <a:t>1/28/2025</a:t>
+              <a:t>1/29/2025</a:t>
             </a:fld>
             <a:endParaRPr lang="en-US" dirty="0"/>
           </a:p>
@@ -5913,63 +5913,99 @@
           <a:p>
             <a:pPr lvl="1"/>
             <a:r>
-              <a:rPr lang="en-US" dirty="0"/>
+              <a:rPr lang="en-US" dirty="0">
+                <a:highlight>
+                  <a:srgbClr val="00FF00"/>
+                </a:highlight>
+              </a:rPr>
               <a:t>Implement the Create function</a:t>
             </a:r>
           </a:p>
           <a:p>
             <a:pPr lvl="2"/>
             <a:r>
-              <a:rPr lang="en-US" dirty="0"/>
+              <a:rPr lang="en-US" dirty="0">
+                <a:highlight>
+                  <a:srgbClr val="FFFF00"/>
+                </a:highlight>
+              </a:rPr>
               <a:t>Test to make sure that the entity is constructed properly</a:t>
             </a:r>
           </a:p>
           <a:p>
             <a:pPr lvl="1"/>
             <a:r>
-              <a:rPr lang="en-US" dirty="0"/>
+              <a:rPr lang="en-US" dirty="0">
+                <a:highlight>
+                  <a:srgbClr val="00FF00"/>
+                </a:highlight>
+              </a:rPr>
               <a:t>Implement the Add and Get functions</a:t>
             </a:r>
           </a:p>
           <a:p>
             <a:pPr lvl="2"/>
             <a:r>
-              <a:rPr lang="en-US" dirty="0"/>
+              <a:rPr lang="en-US" dirty="0">
+                <a:highlight>
+                  <a:srgbClr val="FFFF00"/>
+                </a:highlight>
+              </a:rPr>
               <a:t>Test to make sure that components are added and returned properly</a:t>
             </a:r>
           </a:p>
           <a:p>
             <a:pPr lvl="1"/>
             <a:r>
-              <a:rPr lang="en-US" dirty="0"/>
+              <a:rPr lang="en-US" dirty="0">
+                <a:highlight>
+                  <a:srgbClr val="00FF00"/>
+                </a:highlight>
+              </a:rPr>
               <a:t>Implement the Free function</a:t>
             </a:r>
           </a:p>
           <a:p>
             <a:pPr lvl="2"/>
             <a:r>
-              <a:rPr lang="en-US" dirty="0"/>
+              <a:rPr lang="en-US" dirty="0">
+                <a:highlight>
+                  <a:srgbClr val="FFFF00"/>
+                </a:highlight>
+              </a:rPr>
               <a:t>Test to make sure that every attached component is freed properly</a:t>
             </a:r>
           </a:p>
           <a:p>
             <a:pPr lvl="2"/>
             <a:r>
-              <a:rPr lang="en-US" dirty="0"/>
+              <a:rPr lang="en-US" dirty="0">
+                <a:highlight>
+                  <a:srgbClr val="FFFF00"/>
+                </a:highlight>
+              </a:rPr>
               <a:t>Test to make sure that the entity is freed properly</a:t>
             </a:r>
           </a:p>
           <a:p>
             <a:pPr lvl="2"/>
             <a:r>
-              <a:rPr lang="en-US" dirty="0"/>
+              <a:rPr lang="en-US" dirty="0">
+                <a:highlight>
+                  <a:srgbClr val="FFFF00"/>
+                </a:highlight>
+              </a:rPr>
               <a:t>Test to make sure that the original pointer is set to NULL</a:t>
             </a:r>
           </a:p>
           <a:p>
             <a:pPr lvl="1"/>
             <a:r>
-              <a:rPr lang="en-US" dirty="0"/>
+              <a:rPr lang="en-US" dirty="0">
+                <a:highlight>
+                  <a:srgbClr val="00FF00"/>
+                </a:highlight>
+              </a:rPr>
               <a:t>Implement the Update and Render functions</a:t>
             </a:r>
           </a:p>

</xml_diff>

<commit_message>
📄 update slideshow instructions
</commit_message>
<xml_diff>
--- a/Project2-Lecture.pptx
+++ b/Project2-Lecture.pptx
@@ -6245,21 +6245,33 @@
           <a:p>
             <a:pPr lvl="1"/>
             <a:r>
-              <a:rPr lang="en-US" dirty="0"/>
+              <a:rPr lang="en-US" dirty="0">
+                <a:highlight>
+                  <a:srgbClr val="00FF00"/>
+                </a:highlight>
+              </a:rPr>
               <a:t>Implement the Read functions</a:t>
             </a:r>
           </a:p>
           <a:p>
             <a:pPr lvl="2"/>
             <a:r>
-              <a:rPr lang="en-US" dirty="0"/>
+              <a:rPr lang="en-US" dirty="0">
+                <a:highlight>
+                  <a:srgbClr val="FFFF00"/>
+                </a:highlight>
+              </a:rPr>
               <a:t>Hint: Implement them in the order they appear in the data file</a:t>
             </a:r>
           </a:p>
           <a:p>
             <a:pPr lvl="1"/>
             <a:r>
-              <a:rPr lang="en-US" dirty="0"/>
+              <a:rPr lang="en-US" dirty="0">
+                <a:highlight>
+                  <a:srgbClr val="FF0000"/>
+                </a:highlight>
+              </a:rPr>
               <a:t>Using the debugger, step through each Read function, making sure that each object is created and assigned data correctly</a:t>
             </a:r>
           </a:p>

</xml_diff>

<commit_message>
🔥 take out Mesh testing code
</commit_message>
<xml_diff>
--- a/Project2-Lecture.pptx
+++ b/Project2-Lecture.pptx
@@ -256,7 +256,7 @@
             <a:fld id="{9CE4D9B5-C23F-4F5B-A510-223EE943FD84}" type="datetimeFigureOut">
               <a:rPr lang="en-US" smtClean="0"/>
               <a:pPr/>
-              <a:t>1/29/2025</a:t>
+              <a:t>1/30/2025</a:t>
             </a:fld>
             <a:endParaRPr lang="en-US"/>
           </a:p>
@@ -843,7 +843,7 @@
             <a:fld id="{CC5FAB66-F69F-4B6C-B526-16B5B129EADB}" type="datetime1">
               <a:rPr lang="en-US" smtClean="0"/>
               <a:pPr/>
-              <a:t>1/29/2025</a:t>
+              <a:t>1/30/2025</a:t>
             </a:fld>
             <a:endParaRPr lang="en-US" dirty="0"/>
           </a:p>
@@ -1247,7 +1247,7 @@
             <a:fld id="{818F3258-39DB-480D-AA11-E1EF94FC4695}" type="datetime1">
               <a:rPr lang="en-US" smtClean="0"/>
               <a:pPr/>
-              <a:t>1/29/2025</a:t>
+              <a:t>1/30/2025</a:t>
             </a:fld>
             <a:endParaRPr lang="en-US" dirty="0"/>
           </a:p>
@@ -1425,7 +1425,7 @@
             <a:fld id="{AEC8A4F3-ED06-48DC-8481-6B075B3F12EC}" type="datetime1">
               <a:rPr lang="en-US" smtClean="0"/>
               <a:pPr/>
-              <a:t>1/29/2025</a:t>
+              <a:t>1/30/2025</a:t>
             </a:fld>
             <a:endParaRPr lang="en-US" dirty="0"/>
           </a:p>
@@ -1689,7 +1689,7 @@
             <a:fld id="{409124BB-FC4B-4459-9E83-B488936AD7B8}" type="datetime1">
               <a:rPr lang="en-US" smtClean="0"/>
               <a:pPr/>
-              <a:t>1/29/2025</a:t>
+              <a:t>1/30/2025</a:t>
             </a:fld>
             <a:endParaRPr lang="en-US" dirty="0"/>
           </a:p>
@@ -2059,7 +2059,7 @@
             <a:fld id="{AE645E34-4EAE-44C6-A808-8E7619B5FCEA}" type="datetime1">
               <a:rPr lang="en-US" smtClean="0"/>
               <a:pPr/>
-              <a:t>1/29/2025</a:t>
+              <a:t>1/30/2025</a:t>
             </a:fld>
             <a:endParaRPr lang="en-US" dirty="0"/>
           </a:p>
@@ -2429,7 +2429,7 @@
             <a:fld id="{7EC34C66-FE28-425E-8208-CF7EDC8DF363}" type="datetime1">
               <a:rPr lang="en-US" smtClean="0"/>
               <a:pPr/>
-              <a:t>1/29/2025</a:t>
+              <a:t>1/30/2025</a:t>
             </a:fld>
             <a:endParaRPr lang="en-US" dirty="0"/>
           </a:p>
@@ -2780,7 +2780,7 @@
             <a:fld id="{0444DE73-A3F0-436D-9600-1A6E66F9FFEF}" type="datetime1">
               <a:rPr lang="en-US" smtClean="0"/>
               <a:pPr/>
-              <a:t>1/29/2025</a:t>
+              <a:t>1/30/2025</a:t>
             </a:fld>
             <a:endParaRPr lang="en-US" dirty="0"/>
           </a:p>
@@ -3062,7 +3062,7 @@
             <a:fld id="{FF58DBF8-50A7-4BC0-9320-D3D97C2642BE}" type="datetime1">
               <a:rPr lang="en-US" smtClean="0"/>
               <a:pPr/>
-              <a:t>1/29/2025</a:t>
+              <a:t>1/30/2025</a:t>
             </a:fld>
             <a:endParaRPr lang="en-US" dirty="0"/>
           </a:p>
@@ -3448,7 +3448,7 @@
             <a:fld id="{3B7CFFA9-120C-49D9-8B33-3C2B12A8DBA4}" type="datetime1">
               <a:rPr lang="en-US" smtClean="0"/>
               <a:pPr/>
-              <a:t>1/29/2025</a:t>
+              <a:t>1/30/2025</a:t>
             </a:fld>
             <a:endParaRPr lang="en-US" dirty="0"/>
           </a:p>
@@ -3574,7 +3574,7 @@
             <a:fld id="{5F74FA30-5998-4A94-AC07-116568D8E4BB}" type="datetime1">
               <a:rPr lang="en-US" smtClean="0"/>
               <a:pPr/>
-              <a:t>1/29/2025</a:t>
+              <a:t>1/30/2025</a:t>
             </a:fld>
             <a:endParaRPr lang="en-US" dirty="0"/>
           </a:p>
@@ -3753,7 +3753,7 @@
             <a:fld id="{7B0B7851-DAC7-4535-82A8-F9F52B85F021}" type="datetime1">
               <a:rPr lang="en-US" smtClean="0"/>
               <a:pPr/>
-              <a:t>1/29/2025</a:t>
+              <a:t>1/30/2025</a:t>
             </a:fld>
             <a:endParaRPr lang="en-US" dirty="0"/>
           </a:p>
@@ -4115,7 +4115,7 @@
             <a:fld id="{58E9D1BF-3D47-4605-A719-999F5E730F58}" type="datetime1">
               <a:rPr lang="en-US" smtClean="0"/>
               <a:pPr/>
-              <a:t>1/29/2025</a:t>
+              <a:t>1/30/2025</a:t>
             </a:fld>
             <a:endParaRPr lang="en-US" dirty="0"/>
           </a:p>
@@ -4429,7 +4429,7 @@
             <a:fld id="{7832CE81-818F-4867-A81A-32FEBE6C803F}" type="datetime1">
               <a:rPr lang="en-US" smtClean="0"/>
               <a:pPr/>
-              <a:t>1/29/2025</a:t>
+              <a:t>1/30/2025</a:t>
             </a:fld>
             <a:endParaRPr lang="en-US" dirty="0"/>
           </a:p>

</xml_diff>

<commit_message>
✅ complete Level2Scene features
</commit_message>
<xml_diff>
--- a/Project2-Lecture.pptx
+++ b/Project2-Lecture.pptx
@@ -6450,56 +6450,88 @@
           <a:p>
             <a:pPr lvl="1"/>
             <a:r>
-              <a:rPr lang="en-US" dirty="0"/>
+              <a:rPr lang="en-US" dirty="0">
+                <a:highlight>
+                  <a:srgbClr val="00FF00"/>
+                </a:highlight>
+              </a:rPr>
               <a:t>Follow the detailed instructions</a:t>
             </a:r>
           </a:p>
           <a:p>
             <a:pPr lvl="1"/>
             <a:r>
-              <a:rPr lang="en-US" dirty="0"/>
+              <a:rPr lang="en-US" dirty="0">
+                <a:highlight>
+                  <a:srgbClr val="00FF00"/>
+                </a:highlight>
+              </a:rPr>
               <a:t>Verify that the planet moves and lands correctly</a:t>
             </a:r>
           </a:p>
           <a:p>
             <a:pPr lvl="1"/>
             <a:r>
-              <a:rPr lang="en-US" dirty="0"/>
+              <a:rPr lang="en-US" dirty="0">
+                <a:highlight>
+                  <a:srgbClr val="FFFF00"/>
+                </a:highlight>
+              </a:rPr>
               <a:t>Verify that the game advances to Level2 when the planet “lands” for the third time</a:t>
             </a:r>
           </a:p>
           <a:p>
             <a:pPr lvl="1"/>
             <a:r>
-              <a:rPr lang="en-US" dirty="0"/>
+              <a:rPr lang="en-US" dirty="0">
+                <a:highlight>
+                  <a:srgbClr val="00FF00"/>
+                </a:highlight>
+              </a:rPr>
               <a:t>Verify that the ‘1’ key restarts Level1</a:t>
             </a:r>
           </a:p>
           <a:p>
             <a:pPr lvl="1"/>
             <a:r>
-              <a:rPr lang="en-US" dirty="0"/>
+              <a:rPr lang="en-US" dirty="0">
+                <a:highlight>
+                  <a:srgbClr val="00FF00"/>
+                </a:highlight>
+              </a:rPr>
               <a:t>Verify that the ‘2’ key advances to Level2</a:t>
             </a:r>
           </a:p>
           <a:p>
             <a:pPr lvl="1"/>
             <a:r>
-              <a:rPr lang="en-US" dirty="0"/>
+              <a:rPr lang="en-US" dirty="0">
+                <a:highlight>
+                  <a:srgbClr val="00FF00"/>
+                </a:highlight>
+              </a:rPr>
               <a:t>Verify that the ‘9’ key advances to Sandbox</a:t>
             </a:r>
           </a:p>
           <a:p>
             <a:pPr lvl="1"/>
             <a:r>
-              <a:rPr lang="en-US" dirty="0"/>
+              <a:rPr lang="en-US" dirty="0">
+                <a:highlight>
+                  <a:srgbClr val="00FF00"/>
+                </a:highlight>
+              </a:rPr>
               <a:t>Verify that the ‘0’ key advances to Demo</a:t>
             </a:r>
           </a:p>
           <a:p>
             <a:pPr lvl="1"/>
             <a:r>
-              <a:rPr lang="en-US" dirty="0"/>
+              <a:rPr lang="en-US" dirty="0">
+                <a:highlight>
+                  <a:srgbClr val="00FF00"/>
+                </a:highlight>
+              </a:rPr>
               <a:t>Verify that &lt;ESCAPE&gt; exits the game</a:t>
             </a:r>
           </a:p>
@@ -6678,56 +6710,88 @@
           <a:p>
             <a:pPr lvl="1"/>
             <a:r>
-              <a:rPr lang="en-US" dirty="0"/>
+              <a:rPr lang="en-US" dirty="0">
+                <a:highlight>
+                  <a:srgbClr val="00FF00"/>
+                </a:highlight>
+              </a:rPr>
               <a:t>Follow the detailed instructions</a:t>
             </a:r>
           </a:p>
           <a:p>
             <a:pPr lvl="1"/>
             <a:r>
-              <a:rPr lang="en-US" dirty="0"/>
+              <a:rPr lang="en-US" dirty="0">
+                <a:highlight>
+                  <a:srgbClr val="00FF00"/>
+                </a:highlight>
+              </a:rPr>
               <a:t>Verify that the spaceship moves and orients correctly</a:t>
             </a:r>
           </a:p>
           <a:p>
             <a:pPr lvl="1"/>
             <a:r>
-              <a:rPr lang="en-US" dirty="0"/>
+              <a:rPr lang="en-US" dirty="0">
+                <a:highlight>
+                  <a:srgbClr val="00FF00"/>
+                </a:highlight>
+              </a:rPr>
               <a:t>Verify that the spaceship alpha changes correctly</a:t>
             </a:r>
           </a:p>
           <a:p>
             <a:pPr lvl="1"/>
             <a:r>
-              <a:rPr lang="en-US" dirty="0"/>
+              <a:rPr lang="en-US" dirty="0">
+                <a:highlight>
+                  <a:srgbClr val="00FF00"/>
+                </a:highlight>
+              </a:rPr>
               <a:t>Verify that the ‘1’ key advances to Level1</a:t>
             </a:r>
           </a:p>
           <a:p>
             <a:pPr lvl="1"/>
             <a:r>
-              <a:rPr lang="en-US" dirty="0"/>
+              <a:rPr lang="en-US" dirty="0">
+                <a:highlight>
+                  <a:srgbClr val="00FF00"/>
+                </a:highlight>
+              </a:rPr>
               <a:t>Verify that the ‘2’ key restarts Level2</a:t>
             </a:r>
           </a:p>
           <a:p>
             <a:pPr lvl="1"/>
             <a:r>
-              <a:rPr lang="en-US" dirty="0"/>
+              <a:rPr lang="en-US" dirty="0">
+                <a:highlight>
+                  <a:srgbClr val="00FF00"/>
+                </a:highlight>
+              </a:rPr>
               <a:t>Verify that the ‘9’ key advances to Sandbox</a:t>
             </a:r>
           </a:p>
           <a:p>
             <a:pPr lvl="1"/>
             <a:r>
-              <a:rPr lang="en-US" dirty="0"/>
+              <a:rPr lang="en-US" dirty="0">
+                <a:highlight>
+                  <a:srgbClr val="00FF00"/>
+                </a:highlight>
+              </a:rPr>
               <a:t>Verify that the ‘0’ key advances to Demo</a:t>
             </a:r>
           </a:p>
           <a:p>
             <a:pPr lvl="1"/>
             <a:r>
-              <a:rPr lang="en-US" dirty="0"/>
+              <a:rPr lang="en-US" dirty="0">
+                <a:highlight>
+                  <a:srgbClr val="00FF00"/>
+                </a:highlight>
+              </a:rPr>
               <a:t>Verify that &lt;ESCAPE&gt; exits the game</a:t>
             </a:r>
           </a:p>
@@ -6891,61 +6955,85 @@
           <a:lstStyle/>
           <a:p>
             <a:r>
-              <a:rPr lang="en-US"/>
-              <a:t>DemoScene.</a:t>
-            </a:r>
-            <a:r>
               <a:rPr lang="en-US" dirty="0" err="1"/>
-              <a:t>c</a:t>
+              <a:t>DemoScene.c</a:t>
             </a:r>
             <a:endParaRPr lang="en-US" dirty="0"/>
           </a:p>
           <a:p>
             <a:pPr lvl="1"/>
             <a:r>
-              <a:rPr lang="en-US" dirty="0"/>
+              <a:rPr lang="en-US" dirty="0">
+                <a:highlight>
+                  <a:srgbClr val="00FF00"/>
+                </a:highlight>
+              </a:rPr>
               <a:t>Follow the detailed instructions</a:t>
             </a:r>
           </a:p>
           <a:p>
             <a:pPr lvl="1"/>
             <a:r>
-              <a:rPr lang="en-US" dirty="0"/>
+              <a:rPr lang="en-US" dirty="0">
+                <a:highlight>
+                  <a:srgbClr val="00FF00"/>
+                </a:highlight>
+              </a:rPr>
               <a:t>Verify that the input controls work correctly</a:t>
             </a:r>
           </a:p>
           <a:p>
             <a:pPr lvl="1"/>
             <a:r>
-              <a:rPr lang="en-US" dirty="0"/>
+              <a:rPr lang="en-US" dirty="0">
+                <a:highlight>
+                  <a:srgbClr val="00FF00"/>
+                </a:highlight>
+              </a:rPr>
               <a:t>Verify that the ‘1’ key advances to Level1</a:t>
             </a:r>
           </a:p>
           <a:p>
             <a:pPr lvl="1"/>
             <a:r>
-              <a:rPr lang="en-US" dirty="0"/>
+              <a:rPr lang="en-US" dirty="0">
+                <a:highlight>
+                  <a:srgbClr val="00FF00"/>
+                </a:highlight>
+              </a:rPr>
               <a:t>Verify that the ‘2’ key advances to Level2</a:t>
             </a:r>
           </a:p>
           <a:p>
             <a:pPr lvl="1"/>
             <a:r>
-              <a:rPr lang="en-US" dirty="0"/>
+              <a:rPr lang="en-US" dirty="0">
+                <a:highlight>
+                  <a:srgbClr val="00FF00"/>
+                </a:highlight>
+              </a:rPr>
               <a:t>Verify that the ‘9’ key advances to Sandbox</a:t>
             </a:r>
           </a:p>
           <a:p>
             <a:pPr lvl="1"/>
             <a:r>
-              <a:rPr lang="en-US" dirty="0"/>
+              <a:rPr lang="en-US" dirty="0">
+                <a:highlight>
+                  <a:srgbClr val="00FF00"/>
+                </a:highlight>
+              </a:rPr>
               <a:t>Verify that the ‘0’ key restarts Demo</a:t>
             </a:r>
           </a:p>
           <a:p>
             <a:pPr lvl="1"/>
             <a:r>
-              <a:rPr lang="en-US" dirty="0"/>
+              <a:rPr lang="en-US" dirty="0">
+                <a:highlight>
+                  <a:srgbClr val="00FF00"/>
+                </a:highlight>
+              </a:rPr>
               <a:t>Verify that &lt;ESCAPE&gt; exits the game</a:t>
             </a:r>
           </a:p>

</xml_diff>